<commit_message>
Modify presentation power point
</commit_message>
<xml_diff>
--- a/Presentation.pptx
+++ b/Presentation.pptx
@@ -7,7 +7,11 @@
   <p:sldIdLst>
     <p:sldId id="256" r:id="rId2"/>
     <p:sldId id="257" r:id="rId3"/>
-    <p:sldId id="264" r:id="rId4"/>
+    <p:sldId id="265" r:id="rId4"/>
+    <p:sldId id="266" r:id="rId5"/>
+    <p:sldId id="267" r:id="rId6"/>
+    <p:sldId id="268" r:id="rId7"/>
+    <p:sldId id="264" r:id="rId8"/>
   </p:sldIdLst>
   <p:sldSz cx="9144000" cy="6858000" type="screen4x3"/>
   <p:notesSz cx="6858000" cy="9144000"/>
@@ -14609,26 +14613,10 @@
           <a:lstStyle/>
           <a:p>
             <a:r>
-              <a:rPr lang="fr-FR" dirty="0"/>
-              <a:t>How to </a:t>
+              <a:rPr lang="en-GB" dirty="0" smtClean="0"/>
+              <a:t>How to create a beautiful blog</a:t>
             </a:r>
-            <a:r>
-              <a:rPr lang="fr-FR" dirty="0" err="1"/>
-              <a:t>create</a:t>
-            </a:r>
-            <a:r>
-              <a:rPr lang="fr-FR" dirty="0"/>
-              <a:t> a </a:t>
-            </a:r>
-            <a:r>
-              <a:rPr lang="fr-FR" dirty="0" err="1"/>
-              <a:t>beautiful</a:t>
-            </a:r>
-            <a:r>
-              <a:rPr lang="fr-FR" dirty="0"/>
-              <a:t> blog</a:t>
-            </a:r>
-            <a:endParaRPr lang="fr-FR" dirty="0"/>
+            <a:endParaRPr lang="en-GB" dirty="0"/>
           </a:p>
         </p:txBody>
       </p:sp>
@@ -14707,13 +14695,37 @@
           <a:lstStyle/>
           <a:p>
             <a:r>
-              <a:rPr lang="fr-FR" b="1" dirty="0" smtClean="0"/>
+              <a:rPr lang="en-GB" b="1" smtClean="0"/>
               <a:t>Introduction</a:t>
             </a:r>
-            <a:endParaRPr lang="fr-FR" dirty="0"/>
           </a:p>
           <a:p>
-            <a:endParaRPr lang="fr-FR" dirty="0"/>
+            <a:r>
+              <a:rPr lang="en-GB" b="1" smtClean="0"/>
+              <a:t>Sign up on overblog</a:t>
+            </a:r>
+          </a:p>
+          <a:p>
+            <a:endParaRPr lang="en-GB" b="1" smtClean="0"/>
+          </a:p>
+          <a:p>
+            <a:pPr marL="0" indent="0">
+              <a:buNone/>
+            </a:pPr>
+            <a:endParaRPr lang="en-GB" b="1" smtClean="0"/>
+          </a:p>
+          <a:p>
+            <a:r>
+              <a:rPr lang="en-GB" b="1" smtClean="0"/>
+              <a:t>Sharing it</a:t>
+            </a:r>
+          </a:p>
+          <a:p>
+            <a:r>
+              <a:rPr lang="en-GB" b="1" smtClean="0"/>
+              <a:t>Conclusion</a:t>
+            </a:r>
+            <a:endParaRPr lang="en-GB" b="1"/>
           </a:p>
         </p:txBody>
       </p:sp>
@@ -14733,10 +14745,10 @@
           <a:lstStyle/>
           <a:p>
             <a:r>
-              <a:rPr lang="fr-FR" dirty="0" smtClean="0"/>
+              <a:rPr lang="en-GB" smtClean="0"/>
               <a:t>Contents</a:t>
             </a:r>
-            <a:endParaRPr lang="fr-FR" dirty="0"/>
+            <a:endParaRPr lang="en-GB"/>
           </a:p>
         </p:txBody>
       </p:sp>
@@ -14754,6 +14766,522 @@
 </file>
 
 <file path=ppt/slides/slide3.xml><?xml version="1.0" encoding="utf-8"?>
+<p:sld xmlns:a="http://schemas.openxmlformats.org/drawingml/2006/main" xmlns:r="http://schemas.openxmlformats.org/officeDocument/2006/relationships" xmlns:p="http://schemas.openxmlformats.org/presentationml/2006/main">
+  <p:cSld>
+    <p:spTree>
+      <p:nvGrpSpPr>
+        <p:cNvPr id="1" name=""/>
+        <p:cNvGrpSpPr/>
+        <p:nvPr/>
+      </p:nvGrpSpPr>
+      <p:grpSpPr>
+        <a:xfrm>
+          <a:off x="0" y="0"/>
+          <a:ext cx="0" cy="0"/>
+          <a:chOff x="0" y="0"/>
+          <a:chExt cx="0" cy="0"/>
+        </a:xfrm>
+      </p:grpSpPr>
+      <p:sp>
+        <p:nvSpPr>
+          <p:cNvPr id="5" name="Espace réservé du contenu 4"/>
+          <p:cNvSpPr>
+            <a:spLocks noGrp="1"/>
+          </p:cNvSpPr>
+          <p:nvPr>
+            <p:ph idx="1"/>
+          </p:nvPr>
+        </p:nvSpPr>
+        <p:spPr/>
+        <p:txBody>
+          <a:bodyPr/>
+          <a:lstStyle/>
+          <a:p>
+            <a:r>
+              <a:rPr lang="en-GB" smtClean="0"/>
+              <a:t>Many tools</a:t>
+            </a:r>
+          </a:p>
+          <a:p>
+            <a:r>
+              <a:rPr lang="en-GB" smtClean="0"/>
+              <a:t>Novice to Professional</a:t>
+            </a:r>
+          </a:p>
+          <a:p>
+            <a:r>
+              <a:rPr lang="en-GB" smtClean="0"/>
+              <a:t>Overblog</a:t>
+            </a:r>
+            <a:endParaRPr lang="en-GB"/>
+          </a:p>
+        </p:txBody>
+      </p:sp>
+      <p:sp>
+        <p:nvSpPr>
+          <p:cNvPr id="4" name="Titre 3"/>
+          <p:cNvSpPr>
+            <a:spLocks noGrp="1"/>
+          </p:cNvSpPr>
+          <p:nvPr>
+            <p:ph type="title"/>
+          </p:nvPr>
+        </p:nvSpPr>
+        <p:spPr/>
+        <p:txBody>
+          <a:bodyPr/>
+          <a:lstStyle/>
+          <a:p>
+            <a:r>
+              <a:rPr lang="en-GB" smtClean="0"/>
+              <a:t>Introduction</a:t>
+            </a:r>
+            <a:endParaRPr lang="en-GB"/>
+          </a:p>
+        </p:txBody>
+      </p:sp>
+    </p:spTree>
+    <p:extLst>
+      <p:ext uri="{BB962C8B-B14F-4D97-AF65-F5344CB8AC3E}">
+        <p14:creationId xmlns:p14="http://schemas.microsoft.com/office/powerpoint/2010/main" val="847701789"/>
+      </p:ext>
+    </p:extLst>
+  </p:cSld>
+  <p:clrMapOvr>
+    <a:masterClrMapping/>
+  </p:clrMapOvr>
+</p:sld>
+</file>
+
+<file path=ppt/slides/slide4.xml><?xml version="1.0" encoding="utf-8"?>
+<p:sld xmlns:a="http://schemas.openxmlformats.org/drawingml/2006/main" xmlns:r="http://schemas.openxmlformats.org/officeDocument/2006/relationships" xmlns:p="http://schemas.openxmlformats.org/presentationml/2006/main">
+  <p:cSld>
+    <p:spTree>
+      <p:nvGrpSpPr>
+        <p:cNvPr id="1" name=""/>
+        <p:cNvGrpSpPr/>
+        <p:nvPr/>
+      </p:nvGrpSpPr>
+      <p:grpSpPr>
+        <a:xfrm>
+          <a:off x="0" y="0"/>
+          <a:ext cx="0" cy="0"/>
+          <a:chOff x="0" y="0"/>
+          <a:chExt cx="0" cy="0"/>
+        </a:xfrm>
+      </p:grpSpPr>
+      <p:sp>
+        <p:nvSpPr>
+          <p:cNvPr id="5" name="Espace réservé du contenu 4"/>
+          <p:cNvSpPr>
+            <a:spLocks noGrp="1"/>
+          </p:cNvSpPr>
+          <p:nvPr>
+            <p:ph idx="1"/>
+          </p:nvPr>
+        </p:nvSpPr>
+        <p:spPr/>
+        <p:txBody>
+          <a:bodyPr/>
+          <a:lstStyle/>
+          <a:p>
+            <a:pPr marL="457200" indent="-457200">
+              <a:buFont typeface="+mj-lt"/>
+              <a:buAutoNum type="arabicPeriod"/>
+            </a:pPr>
+            <a:r>
+              <a:rPr lang="en-GB" smtClean="0"/>
+              <a:t>Go on overblog website</a:t>
+            </a:r>
+          </a:p>
+          <a:p>
+            <a:pPr marL="457200" indent="-457200">
+              <a:buFont typeface="+mj-lt"/>
+              <a:buAutoNum type="arabicPeriod"/>
+            </a:pPr>
+            <a:r>
+              <a:rPr lang="en-GB" smtClean="0"/>
+              <a:t>Sign up</a:t>
+            </a:r>
+          </a:p>
+          <a:p>
+            <a:pPr marL="457200" indent="-457200">
+              <a:buFont typeface="+mj-lt"/>
+              <a:buAutoNum type="arabicPeriod"/>
+            </a:pPr>
+            <a:r>
+              <a:rPr lang="en-GB" smtClean="0"/>
+              <a:t>Valid your email address</a:t>
+            </a:r>
+          </a:p>
+          <a:p>
+            <a:pPr marL="457200" indent="-457200">
+              <a:buFont typeface="+mj-lt"/>
+              <a:buAutoNum type="arabicPeriod"/>
+            </a:pPr>
+            <a:r>
+              <a:rPr lang="en-GB" smtClean="0"/>
+              <a:t>Ready to enrich your blog</a:t>
+            </a:r>
+            <a:endParaRPr lang="en-GB"/>
+          </a:p>
+        </p:txBody>
+      </p:sp>
+      <p:sp>
+        <p:nvSpPr>
+          <p:cNvPr id="4" name="Titre 3"/>
+          <p:cNvSpPr>
+            <a:spLocks noGrp="1"/>
+          </p:cNvSpPr>
+          <p:nvPr>
+            <p:ph type="title"/>
+          </p:nvPr>
+        </p:nvSpPr>
+        <p:spPr/>
+        <p:txBody>
+          <a:bodyPr/>
+          <a:lstStyle/>
+          <a:p>
+            <a:r>
+              <a:rPr lang="en-GB" smtClean="0"/>
+              <a:t>Sign up on overblog</a:t>
+            </a:r>
+            <a:endParaRPr lang="en-GB"/>
+          </a:p>
+        </p:txBody>
+      </p:sp>
+    </p:spTree>
+    <p:extLst>
+      <p:ext uri="{BB962C8B-B14F-4D97-AF65-F5344CB8AC3E}">
+        <p14:creationId xmlns:p14="http://schemas.microsoft.com/office/powerpoint/2010/main" val="40235626"/>
+      </p:ext>
+    </p:extLst>
+  </p:cSld>
+  <p:clrMapOvr>
+    <a:masterClrMapping/>
+  </p:clrMapOvr>
+</p:sld>
+</file>
+
+<file path=ppt/slides/slide5.xml><?xml version="1.0" encoding="utf-8"?>
+<p:sld xmlns:a="http://schemas.openxmlformats.org/drawingml/2006/main" xmlns:r="http://schemas.openxmlformats.org/officeDocument/2006/relationships" xmlns:p="http://schemas.openxmlformats.org/presentationml/2006/main">
+  <p:cSld>
+    <p:spTree>
+      <p:nvGrpSpPr>
+        <p:cNvPr id="1" name=""/>
+        <p:cNvGrpSpPr/>
+        <p:nvPr/>
+      </p:nvGrpSpPr>
+      <p:grpSpPr>
+        <a:xfrm>
+          <a:off x="0" y="0"/>
+          <a:ext cx="0" cy="0"/>
+          <a:chOff x="0" y="0"/>
+          <a:chExt cx="0" cy="0"/>
+        </a:xfrm>
+      </p:grpSpPr>
+      <p:sp>
+        <p:nvSpPr>
+          <p:cNvPr id="5" name="Espace réservé du contenu 4"/>
+          <p:cNvSpPr>
+            <a:spLocks noGrp="1"/>
+          </p:cNvSpPr>
+          <p:nvPr>
+            <p:ph idx="1"/>
+          </p:nvPr>
+        </p:nvSpPr>
+        <p:spPr/>
+        <p:txBody>
+          <a:bodyPr/>
+          <a:lstStyle/>
+          <a:p>
+            <a:r>
+              <a:rPr lang="en-GB" smtClean="0"/>
+              <a:t>It’s beautiful to make a blog.</a:t>
+            </a:r>
+          </a:p>
+          <a:p>
+            <a:r>
+              <a:rPr lang="en-GB" smtClean="0"/>
+              <a:t>But without reader, is it joyous ?</a:t>
+            </a:r>
+          </a:p>
+          <a:p>
+            <a:r>
+              <a:rPr lang="en-GB" smtClean="0"/>
+              <a:t>Share it !</a:t>
+            </a:r>
+          </a:p>
+          <a:p>
+            <a:r>
+              <a:rPr lang="en-GB" smtClean="0"/>
+              <a:t>Like it !</a:t>
+            </a:r>
+          </a:p>
+          <a:p>
+            <a:endParaRPr lang="en-GB"/>
+          </a:p>
+        </p:txBody>
+      </p:sp>
+      <p:sp>
+        <p:nvSpPr>
+          <p:cNvPr id="4" name="Titre 3"/>
+          <p:cNvSpPr>
+            <a:spLocks noGrp="1"/>
+          </p:cNvSpPr>
+          <p:nvPr>
+            <p:ph type="title"/>
+          </p:nvPr>
+        </p:nvSpPr>
+        <p:spPr/>
+        <p:txBody>
+          <a:bodyPr/>
+          <a:lstStyle/>
+          <a:p>
+            <a:r>
+              <a:rPr lang="en-GB" smtClean="0"/>
+              <a:t>Share it to let it know !</a:t>
+            </a:r>
+            <a:endParaRPr lang="en-GB"/>
+          </a:p>
+        </p:txBody>
+      </p:sp>
+      <p:pic>
+        <p:nvPicPr>
+          <p:cNvPr id="6" name="Picture 4" descr="F:\GitHub\EnglishProjectBlog\Rapport\Images\blogBar.png"/>
+          <p:cNvPicPr>
+            <a:picLocks noChangeAspect="1" noChangeArrowheads="1"/>
+          </p:cNvPicPr>
+          <p:nvPr/>
+        </p:nvPicPr>
+        <p:blipFill>
+          <a:blip r:embed="rId2">
+            <a:extLst>
+              <a:ext uri="{28A0092B-C50C-407E-A947-70E740481C1C}">
+                <a14:useLocalDpi xmlns:a14="http://schemas.microsoft.com/office/drawing/2010/main" val="0"/>
+              </a:ext>
+            </a:extLst>
+          </a:blip>
+          <a:srcRect/>
+          <a:stretch>
+            <a:fillRect/>
+          </a:stretch>
+        </p:blipFill>
+        <p:spPr bwMode="auto">
+          <a:xfrm>
+            <a:off x="5752115" y="3602537"/>
+            <a:ext cx="2714625" cy="390525"/>
+          </a:xfrm>
+          <a:prstGeom prst="rect">
+            <a:avLst/>
+          </a:prstGeom>
+          <a:noFill/>
+          <a:extLst>
+            <a:ext uri="{909E8E84-426E-40dd-AFC4-6F175D3DCCD1}">
+              <a14:hiddenFill xmlns:a14="http://schemas.microsoft.com/office/drawing/2010/main">
+                <a:solidFill>
+                  <a:srgbClr val="FFFFFF"/>
+                </a:solidFill>
+              </a14:hiddenFill>
+            </a:ext>
+          </a:extLst>
+        </p:spPr>
+      </p:pic>
+      <p:pic>
+        <p:nvPicPr>
+          <p:cNvPr id="7" name="Picture 3" descr="F:\GitHub\EnglishProjectBlog\Rapport\Images\articleBar.png"/>
+          <p:cNvPicPr>
+            <a:picLocks noChangeAspect="1" noChangeArrowheads="1"/>
+          </p:cNvPicPr>
+          <p:nvPr/>
+        </p:nvPicPr>
+        <p:blipFill>
+          <a:blip r:embed="rId3">
+            <a:extLst>
+              <a:ext uri="{28A0092B-C50C-407E-A947-70E740481C1C}">
+                <a14:useLocalDpi xmlns:a14="http://schemas.microsoft.com/office/drawing/2010/main" val="0"/>
+              </a:ext>
+            </a:extLst>
+          </a:blip>
+          <a:srcRect/>
+          <a:stretch>
+            <a:fillRect/>
+          </a:stretch>
+        </p:blipFill>
+        <p:spPr bwMode="auto">
+          <a:xfrm>
+            <a:off x="2554674" y="4041436"/>
+            <a:ext cx="6116638" cy="495300"/>
+          </a:xfrm>
+          <a:prstGeom prst="rect">
+            <a:avLst/>
+          </a:prstGeom>
+          <a:noFill/>
+          <a:extLst>
+            <a:ext uri="{909E8E84-426E-40dd-AFC4-6F175D3DCCD1}">
+              <a14:hiddenFill xmlns:a14="http://schemas.microsoft.com/office/drawing/2010/main">
+                <a:solidFill>
+                  <a:srgbClr val="FFFFFF"/>
+                </a:solidFill>
+              </a14:hiddenFill>
+            </a:ext>
+          </a:extLst>
+        </p:spPr>
+      </p:pic>
+    </p:spTree>
+    <p:extLst>
+      <p:ext uri="{BB962C8B-B14F-4D97-AF65-F5344CB8AC3E}">
+        <p14:creationId xmlns:p14="http://schemas.microsoft.com/office/powerpoint/2010/main" val="2864803881"/>
+      </p:ext>
+    </p:extLst>
+  </p:cSld>
+  <p:clrMapOvr>
+    <a:masterClrMapping/>
+  </p:clrMapOvr>
+</p:sld>
+</file>
+
+<file path=ppt/slides/slide6.xml><?xml version="1.0" encoding="utf-8"?>
+<p:sld xmlns:a="http://schemas.openxmlformats.org/drawingml/2006/main" xmlns:r="http://schemas.openxmlformats.org/officeDocument/2006/relationships" xmlns:p="http://schemas.openxmlformats.org/presentationml/2006/main">
+  <p:cSld>
+    <p:spTree>
+      <p:nvGrpSpPr>
+        <p:cNvPr id="1" name=""/>
+        <p:cNvGrpSpPr/>
+        <p:nvPr/>
+      </p:nvGrpSpPr>
+      <p:grpSpPr>
+        <a:xfrm>
+          <a:off x="0" y="0"/>
+          <a:ext cx="0" cy="0"/>
+          <a:chOff x="0" y="0"/>
+          <a:chExt cx="0" cy="0"/>
+        </a:xfrm>
+      </p:grpSpPr>
+      <p:sp>
+        <p:nvSpPr>
+          <p:cNvPr id="2" name="Espace réservé du contenu 1"/>
+          <p:cNvSpPr>
+            <a:spLocks noGrp="1"/>
+          </p:cNvSpPr>
+          <p:nvPr>
+            <p:ph idx="1"/>
+          </p:nvPr>
+        </p:nvSpPr>
+        <p:spPr>
+          <a:xfrm>
+            <a:off x="872067" y="2675466"/>
+            <a:ext cx="5385271" cy="3706229"/>
+          </a:xfrm>
+        </p:spPr>
+        <p:txBody>
+          <a:bodyPr anchor="ctr"/>
+          <a:lstStyle/>
+          <a:p>
+            <a:r>
+              <a:rPr lang="en-GB" smtClean="0"/>
+              <a:t>Write a lot of articles bored you ?</a:t>
+            </a:r>
+          </a:p>
+          <a:p>
+            <a:r>
+              <a:rPr lang="en-GB" smtClean="0"/>
+              <a:t>You can automatically use your facebook publications.</a:t>
+            </a:r>
+          </a:p>
+          <a:p>
+            <a:r>
+              <a:rPr lang="en-GB" smtClean="0"/>
+              <a:t>So let all this people know your personal life.</a:t>
+            </a:r>
+          </a:p>
+          <a:p>
+            <a:r>
+              <a:rPr lang="en-GB" smtClean="0"/>
+              <a:t>Just click on the deadly button and take care of your boss.</a:t>
+            </a:r>
+            <a:endParaRPr lang="en-GB"/>
+          </a:p>
+        </p:txBody>
+      </p:sp>
+      <p:sp>
+        <p:nvSpPr>
+          <p:cNvPr id="3" name="Titre 2"/>
+          <p:cNvSpPr>
+            <a:spLocks noGrp="1"/>
+          </p:cNvSpPr>
+          <p:nvPr>
+            <p:ph type="title"/>
+          </p:nvPr>
+        </p:nvSpPr>
+        <p:spPr/>
+        <p:txBody>
+          <a:bodyPr/>
+          <a:lstStyle/>
+          <a:p>
+            <a:r>
+              <a:rPr lang="en-GB" smtClean="0"/>
+              <a:t>Feed it !</a:t>
+            </a:r>
+            <a:endParaRPr lang="en-GB"/>
+          </a:p>
+        </p:txBody>
+      </p:sp>
+      <p:pic>
+        <p:nvPicPr>
+          <p:cNvPr id="4" name="Picture 2" descr="F:\GitHub\EnglishProjectBlog\Rapport\Images\shareIni.png"/>
+          <p:cNvPicPr>
+            <a:picLocks noChangeAspect="1" noChangeArrowheads="1"/>
+          </p:cNvPicPr>
+          <p:nvPr/>
+        </p:nvPicPr>
+        <p:blipFill>
+          <a:blip r:embed="rId2">
+            <a:extLst>
+              <a:ext uri="{28A0092B-C50C-407E-A947-70E740481C1C}">
+                <a14:useLocalDpi xmlns:a14="http://schemas.microsoft.com/office/drawing/2010/main" val="0"/>
+              </a:ext>
+            </a:extLst>
+          </a:blip>
+          <a:srcRect/>
+          <a:stretch>
+            <a:fillRect/>
+          </a:stretch>
+        </p:blipFill>
+        <p:spPr bwMode="auto">
+          <a:xfrm>
+            <a:off x="6660232" y="2675466"/>
+            <a:ext cx="2232248" cy="4012352"/>
+          </a:xfrm>
+          <a:prstGeom prst="rect">
+            <a:avLst/>
+          </a:prstGeom>
+          <a:noFill/>
+          <a:extLst>
+            <a:ext uri="{909E8E84-426E-40dd-AFC4-6F175D3DCCD1}">
+              <a14:hiddenFill xmlns:a14="http://schemas.microsoft.com/office/drawing/2010/main">
+                <a:solidFill>
+                  <a:srgbClr val="FFFFFF"/>
+                </a:solidFill>
+              </a14:hiddenFill>
+            </a:ext>
+          </a:extLst>
+        </p:spPr>
+      </p:pic>
+    </p:spTree>
+    <p:extLst>
+      <p:ext uri="{BB962C8B-B14F-4D97-AF65-F5344CB8AC3E}">
+        <p14:creationId xmlns:p14="http://schemas.microsoft.com/office/powerpoint/2010/main" val="354734717"/>
+      </p:ext>
+    </p:extLst>
+  </p:cSld>
+  <p:clrMapOvr>
+    <a:masterClrMapping/>
+  </p:clrMapOvr>
+</p:sld>
+</file>
+
+<file path=ppt/slides/slide7.xml><?xml version="1.0" encoding="utf-8"?>
 <p:sld xmlns:a="http://schemas.openxmlformats.org/drawingml/2006/main" xmlns:r="http://schemas.openxmlformats.org/officeDocument/2006/relationships" xmlns:p="http://schemas.openxmlformats.org/presentationml/2006/main">
   <p:cSld>
     <p:spTree>

</xml_diff>

<commit_message>
Add image in slide
</commit_message>
<xml_diff>
--- a/Presentation.pptx
+++ b/Presentation.pptx
@@ -14840,6 +14840,30 @@
           </a:p>
         </p:txBody>
       </p:sp>
+      <p:pic>
+        <p:nvPicPr>
+          <p:cNvPr id="2" name="Image 1"/>
+          <p:cNvPicPr>
+            <a:picLocks noChangeAspect="1"/>
+          </p:cNvPicPr>
+          <p:nvPr/>
+        </p:nvPicPr>
+        <p:blipFill>
+          <a:blip r:embed="rId2"/>
+          <a:stretch>
+            <a:fillRect/>
+          </a:stretch>
+        </p:blipFill>
+        <p:spPr>
+          <a:xfrm>
+            <a:off x="4695415" y="3531618"/>
+            <a:ext cx="2951330" cy="2478329"/>
+          </a:xfrm>
+          <a:prstGeom prst="rect">
+            <a:avLst/>
+          </a:prstGeom>
+        </p:spPr>
+      </p:pic>
     </p:spTree>
     <p:extLst>
       <p:ext uri="{BB962C8B-B14F-4D97-AF65-F5344CB8AC3E}">

</xml_diff>

<commit_message>
Modify the size of marging -> We win 2 pages
</commit_message>
<xml_diff>
--- a/Presentation.pptx
+++ b/Presentation.pptx
@@ -1926,7 +1926,7 @@
             <a:fld id="{E30E2307-1E40-4E12-8716-25BFDA8E7013}" type="datetime1">
               <a:rPr lang="en-US" smtClean="0"/>
               <a:pPr/>
-              <a:t>11/04/13</a:t>
+              <a:t>12/04/13</a:t>
             </a:fld>
             <a:endParaRPr lang="en-US"/>
           </a:p>
@@ -2109,7 +2109,7 @@
             <a:fld id="{E5CFCF5A-EA79-452C-A52C-1A2668C2E7DF}" type="datetime1">
               <a:rPr lang="en-US" smtClean="0"/>
               <a:pPr/>
-              <a:t>11/04/13</a:t>
+              <a:t>12/04/13</a:t>
             </a:fld>
             <a:endParaRPr lang="en-US"/>
           </a:p>
@@ -2262,7 +2262,7 @@
             <a:fld id="{2E5C4C28-BD4B-4892-9A2D-6E19BD753A9A}" type="datetime1">
               <a:rPr lang="en-US" smtClean="0"/>
               <a:pPr/>
-              <a:t>11/04/13</a:t>
+              <a:t>12/04/13</a:t>
             </a:fld>
             <a:endParaRPr lang="en-US"/>
           </a:p>
@@ -4090,7 +4090,7 @@
             <a:fld id="{61FD9D02-426E-46C9-9EE9-0DE1EF8B2838}" type="datetime1">
               <a:rPr lang="en-US" smtClean="0"/>
               <a:pPr/>
-              <a:t>11/04/13</a:t>
+              <a:t>12/04/13</a:t>
             </a:fld>
             <a:endParaRPr lang="en-US"/>
           </a:p>
@@ -5962,7 +5962,7 @@
             <a:fld id="{7B8AEBBE-F8B2-42CF-9895-E86A608384EB}" type="datetime1">
               <a:rPr lang="en-US" smtClean="0"/>
               <a:pPr/>
-              <a:t>11/04/13</a:t>
+              <a:t>12/04/13</a:t>
             </a:fld>
             <a:endParaRPr lang="en-US"/>
           </a:p>
@@ -6077,7 +6077,7 @@
             <a:fld id="{E1FAA6B6-10E5-4810-BC9F-DA72D8452E73}" type="datetime1">
               <a:rPr lang="en-US" smtClean="0"/>
               <a:pPr/>
-              <a:t>11/04/13</a:t>
+              <a:t>12/04/13</a:t>
             </a:fld>
             <a:endParaRPr lang="en-US"/>
           </a:p>
@@ -6620,7 +6620,7 @@
             <a:fld id="{6D18D072-EF12-4AA2-BD71-ABC68B06D0E2}" type="datetime1">
               <a:rPr lang="en-US" smtClean="0"/>
               <a:pPr/>
-              <a:t>11/04/13</a:t>
+              <a:t>12/04/13</a:t>
             </a:fld>
             <a:endParaRPr lang="en-US"/>
           </a:p>
@@ -6735,7 +6735,7 @@
             <a:fld id="{B8CDBF60-6CC3-4B74-A60D-3486985E4346}" type="datetime1">
               <a:rPr lang="en-US" smtClean="0"/>
               <a:pPr/>
-              <a:t>11/04/13</a:t>
+              <a:t>12/04/13</a:t>
             </a:fld>
             <a:endParaRPr lang="en-US"/>
           </a:p>
@@ -8448,7 +8448,7 @@
             <a:fld id="{22714818-984F-4759-BF72-A33BDC1963BD}" type="datetime1">
               <a:rPr lang="en-US" smtClean="0"/>
               <a:pPr/>
-              <a:t>11/04/13</a:t>
+              <a:t>12/04/13</a:t>
             </a:fld>
             <a:endParaRPr lang="en-US"/>
           </a:p>
@@ -8601,7 +8601,7 @@
             <a:fld id="{9EA7E191-5F94-4FC1-B823-BD7CABF7FA06}" type="datetime1">
               <a:rPr lang="en-US" smtClean="0"/>
               <a:pPr/>
-              <a:t>11/04/13</a:t>
+              <a:t>12/04/13</a:t>
             </a:fld>
             <a:endParaRPr lang="en-US"/>
           </a:p>
@@ -12218,7 +12218,7 @@
             <a:fld id="{88856D55-EFBE-4F9B-8A5F-09D42CA22A9B}" type="datetime1">
               <a:rPr lang="en-US" smtClean="0"/>
               <a:pPr/>
-              <a:t>11/04/13</a:t>
+              <a:t>12/04/13</a:t>
             </a:fld>
             <a:endParaRPr lang="en-US"/>
           </a:p>
@@ -14079,7 +14079,7 @@
             <a:fld id="{9D1D110F-3F4E-48D9-B8AA-5D0E825AFDBA}" type="datetime1">
               <a:rPr lang="en-US" smtClean="0"/>
               <a:pPr/>
-              <a:t>11/04/13</a:t>
+              <a:t>12/04/13</a:t>
             </a:fld>
             <a:endParaRPr lang="en-US"/>
           </a:p>
@@ -14695,37 +14695,46 @@
           <a:lstStyle/>
           <a:p>
             <a:r>
-              <a:rPr lang="en-GB" b="1" smtClean="0"/>
+              <a:rPr lang="en-GB" b="1" dirty="0" smtClean="0"/>
               <a:t>Introduction</a:t>
             </a:r>
           </a:p>
           <a:p>
             <a:r>
-              <a:rPr lang="en-GB" b="1" smtClean="0"/>
-              <a:t>Sign up on overblog</a:t>
+              <a:rPr lang="en-GB" b="1" dirty="0" smtClean="0"/>
+              <a:t>Sign up on </a:t>
             </a:r>
+            <a:r>
+              <a:rPr lang="en-GB" b="1" dirty="0" err="1" smtClean="0"/>
+              <a:t>overblog</a:t>
+            </a:r>
+            <a:endParaRPr lang="en-GB" b="1" dirty="0" smtClean="0"/>
           </a:p>
           <a:p>
-            <a:endParaRPr lang="en-GB" b="1" smtClean="0"/>
+            <a:r>
+              <a:rPr lang="en-GB" b="1" dirty="0" smtClean="0"/>
+              <a:t>Create an article</a:t>
+            </a:r>
+            <a:endParaRPr lang="en-GB" b="1" dirty="0" smtClean="0"/>
           </a:p>
           <a:p>
             <a:pPr marL="0" indent="0">
               <a:buNone/>
             </a:pPr>
-            <a:endParaRPr lang="en-GB" b="1" smtClean="0"/>
+            <a:endParaRPr lang="en-GB" b="1" dirty="0" smtClean="0"/>
           </a:p>
           <a:p>
             <a:r>
-              <a:rPr lang="en-GB" b="1" smtClean="0"/>
+              <a:rPr lang="en-GB" b="1" dirty="0" smtClean="0"/>
               <a:t>Sharing it</a:t>
             </a:r>
           </a:p>
           <a:p>
             <a:r>
-              <a:rPr lang="en-GB" b="1" smtClean="0"/>
+              <a:rPr lang="en-GB" b="1" dirty="0" smtClean="0"/>
               <a:t>Conclusion</a:t>
             </a:r>
-            <a:endParaRPr lang="en-GB" b="1"/>
+            <a:endParaRPr lang="en-GB" b="1" dirty="0"/>
           </a:p>
         </p:txBody>
       </p:sp>

</xml_diff>

<commit_message>
Add part pimp in slides
</commit_message>
<xml_diff>
--- a/Presentation.pptx
+++ b/Presentation.pptx
@@ -9,9 +9,11 @@
     <p:sldId id="257" r:id="rId3"/>
     <p:sldId id="265" r:id="rId4"/>
     <p:sldId id="266" r:id="rId5"/>
-    <p:sldId id="267" r:id="rId6"/>
-    <p:sldId id="268" r:id="rId7"/>
-    <p:sldId id="264" r:id="rId8"/>
+    <p:sldId id="269" r:id="rId6"/>
+    <p:sldId id="270" r:id="rId7"/>
+    <p:sldId id="267" r:id="rId8"/>
+    <p:sldId id="268" r:id="rId9"/>
+    <p:sldId id="264" r:id="rId10"/>
   </p:sldIdLst>
   <p:sldSz cx="9144000" cy="6858000" type="screen4x3"/>
   <p:notesSz cx="6858000" cy="9144000"/>
@@ -14713,14 +14715,18 @@
           <a:p>
             <a:r>
               <a:rPr lang="en-GB" b="1" dirty="0" smtClean="0"/>
-              <a:t>Create an article</a:t>
+              <a:t>Create an </a:t>
             </a:r>
-            <a:endParaRPr lang="en-GB" b="1" dirty="0" smtClean="0"/>
+            <a:r>
+              <a:rPr lang="en-GB" b="1" dirty="0" smtClean="0"/>
+              <a:t>article</a:t>
+            </a:r>
           </a:p>
           <a:p>
-            <a:pPr marL="0" indent="0">
-              <a:buNone/>
-            </a:pPr>
+            <a:r>
+              <a:rPr lang="en-GB" b="1" dirty="0" smtClean="0"/>
+              <a:t>Pimp your blog !</a:t>
+            </a:r>
             <a:endParaRPr lang="en-GB" b="1" dirty="0" smtClean="0"/>
           </a:p>
           <a:p>
@@ -15015,6 +15021,252 @@
       </p:grpSpPr>
       <p:sp>
         <p:nvSpPr>
+          <p:cNvPr id="2" name="Espace réservé du contenu 1"/>
+          <p:cNvSpPr>
+            <a:spLocks noGrp="1"/>
+          </p:cNvSpPr>
+          <p:nvPr>
+            <p:ph idx="1"/>
+          </p:nvPr>
+        </p:nvSpPr>
+        <p:spPr/>
+        <p:txBody>
+          <a:bodyPr/>
+          <a:lstStyle/>
+          <a:p>
+            <a:r>
+              <a:rPr lang="en-GB" smtClean="0"/>
+              <a:t>Choose your theme</a:t>
+            </a:r>
+          </a:p>
+          <a:p>
+            <a:r>
+              <a:rPr lang="en-GB" smtClean="0"/>
+              <a:t>Modify it</a:t>
+            </a:r>
+            <a:endParaRPr lang="en-GB"/>
+          </a:p>
+        </p:txBody>
+      </p:sp>
+      <p:sp>
+        <p:nvSpPr>
+          <p:cNvPr id="3" name="Titre 2"/>
+          <p:cNvSpPr>
+            <a:spLocks noGrp="1"/>
+          </p:cNvSpPr>
+          <p:nvPr>
+            <p:ph type="title"/>
+          </p:nvPr>
+        </p:nvSpPr>
+        <p:spPr/>
+        <p:txBody>
+          <a:bodyPr/>
+          <a:lstStyle/>
+          <a:p>
+            <a:r>
+              <a:rPr lang="en-GB" smtClean="0"/>
+              <a:t>Pimp your blog !</a:t>
+            </a:r>
+            <a:endParaRPr lang="en-GB"/>
+          </a:p>
+        </p:txBody>
+      </p:sp>
+      <p:pic>
+        <p:nvPicPr>
+          <p:cNvPr id="4" name="Picture 2" descr="C:\Users\utilisateur\Desktop\EnglishProjectBlog\Rapport\Images\ChooseYourTheme.png"/>
+          <p:cNvPicPr>
+            <a:picLocks noChangeAspect="1" noChangeArrowheads="1"/>
+          </p:cNvPicPr>
+          <p:nvPr/>
+        </p:nvPicPr>
+        <p:blipFill>
+          <a:blip r:embed="rId2">
+            <a:extLst>
+              <a:ext uri="{28A0092B-C50C-407E-A947-70E740481C1C}">
+                <a14:useLocalDpi xmlns:a14="http://schemas.microsoft.com/office/drawing/2010/main" val="0"/>
+              </a:ext>
+            </a:extLst>
+          </a:blip>
+          <a:srcRect/>
+          <a:stretch>
+            <a:fillRect/>
+          </a:stretch>
+        </p:blipFill>
+        <p:spPr bwMode="auto">
+          <a:xfrm>
+            <a:off x="4144572" y="2998961"/>
+            <a:ext cx="4662226" cy="3127202"/>
+          </a:xfrm>
+          <a:prstGeom prst="rect">
+            <a:avLst/>
+          </a:prstGeom>
+          <a:noFill/>
+          <a:extLst>
+            <a:ext uri="{909E8E84-426E-40dd-AFC4-6F175D3DCCD1}">
+              <a14:hiddenFill xmlns:a14="http://schemas.microsoft.com/office/drawing/2010/main">
+                <a:solidFill>
+                  <a:srgbClr val="FFFFFF"/>
+                </a:solidFill>
+              </a14:hiddenFill>
+            </a:ext>
+          </a:extLst>
+        </p:spPr>
+      </p:pic>
+    </p:spTree>
+    <p:extLst>
+      <p:ext uri="{BB962C8B-B14F-4D97-AF65-F5344CB8AC3E}">
+        <p14:creationId xmlns:p14="http://schemas.microsoft.com/office/powerpoint/2010/main" val="1868540461"/>
+      </p:ext>
+    </p:extLst>
+  </p:cSld>
+  <p:clrMapOvr>
+    <a:masterClrMapping/>
+  </p:clrMapOvr>
+</p:sld>
+</file>
+
+<file path=ppt/slides/slide6.xml><?xml version="1.0" encoding="utf-8"?>
+<p:sld xmlns:a="http://schemas.openxmlformats.org/drawingml/2006/main" xmlns:r="http://schemas.openxmlformats.org/officeDocument/2006/relationships" xmlns:p="http://schemas.openxmlformats.org/presentationml/2006/main">
+  <p:cSld>
+    <p:spTree>
+      <p:nvGrpSpPr>
+        <p:cNvPr id="1" name=""/>
+        <p:cNvGrpSpPr/>
+        <p:nvPr/>
+      </p:nvGrpSpPr>
+      <p:grpSpPr>
+        <a:xfrm>
+          <a:off x="0" y="0"/>
+          <a:ext cx="0" cy="0"/>
+          <a:chOff x="0" y="0"/>
+          <a:chExt cx="0" cy="0"/>
+        </a:xfrm>
+      </p:grpSpPr>
+      <p:sp>
+        <p:nvSpPr>
+          <p:cNvPr id="5" name="Espace réservé du contenu 4"/>
+          <p:cNvSpPr>
+            <a:spLocks noGrp="1"/>
+          </p:cNvSpPr>
+          <p:nvPr>
+            <p:ph idx="1"/>
+          </p:nvPr>
+        </p:nvSpPr>
+        <p:spPr/>
+        <p:txBody>
+          <a:bodyPr/>
+          <a:lstStyle/>
+          <a:p>
+            <a:r>
+              <a:rPr lang="en-GB" smtClean="0"/>
+              <a:t>Preview it</a:t>
+            </a:r>
+          </a:p>
+          <a:p>
+            <a:r>
+              <a:rPr lang="en-GB" smtClean="0"/>
+              <a:t>Apply it</a:t>
+            </a:r>
+            <a:endParaRPr lang="en-GB"/>
+          </a:p>
+        </p:txBody>
+      </p:sp>
+      <p:sp>
+        <p:nvSpPr>
+          <p:cNvPr id="4" name="Titre 3"/>
+          <p:cNvSpPr>
+            <a:spLocks noGrp="1"/>
+          </p:cNvSpPr>
+          <p:nvPr>
+            <p:ph type="title"/>
+          </p:nvPr>
+        </p:nvSpPr>
+        <p:spPr/>
+        <p:txBody>
+          <a:bodyPr/>
+          <a:lstStyle/>
+          <a:p>
+            <a:r>
+              <a:rPr lang="en-GB" smtClean="0"/>
+              <a:t>Pimp your blog !</a:t>
+            </a:r>
+            <a:endParaRPr lang="en-GB"/>
+          </a:p>
+        </p:txBody>
+      </p:sp>
+      <p:pic>
+        <p:nvPicPr>
+          <p:cNvPr id="6" name="Picture 2" descr="E:\imageDiapo.png"/>
+          <p:cNvPicPr>
+            <a:picLocks noChangeAspect="1" noChangeArrowheads="1"/>
+          </p:cNvPicPr>
+          <p:nvPr/>
+        </p:nvPicPr>
+        <p:blipFill>
+          <a:blip r:embed="rId2">
+            <a:extLst>
+              <a:ext uri="{28A0092B-C50C-407E-A947-70E740481C1C}">
+                <a14:useLocalDpi xmlns:a14="http://schemas.microsoft.com/office/drawing/2010/main" val="0"/>
+              </a:ext>
+            </a:extLst>
+          </a:blip>
+          <a:srcRect/>
+          <a:stretch>
+            <a:fillRect/>
+          </a:stretch>
+        </p:blipFill>
+        <p:spPr bwMode="auto">
+          <a:xfrm>
+            <a:off x="2814911" y="2919053"/>
+            <a:ext cx="6042262" cy="3207110"/>
+          </a:xfrm>
+          <a:prstGeom prst="rect">
+            <a:avLst/>
+          </a:prstGeom>
+          <a:noFill/>
+          <a:extLst>
+            <a:ext uri="{909E8E84-426E-40dd-AFC4-6F175D3DCCD1}">
+              <a14:hiddenFill xmlns:a14="http://schemas.microsoft.com/office/drawing/2010/main">
+                <a:solidFill>
+                  <a:srgbClr val="FFFFFF"/>
+                </a:solidFill>
+              </a14:hiddenFill>
+            </a:ext>
+          </a:extLst>
+        </p:spPr>
+      </p:pic>
+    </p:spTree>
+    <p:extLst>
+      <p:ext uri="{BB962C8B-B14F-4D97-AF65-F5344CB8AC3E}">
+        <p14:creationId xmlns:p14="http://schemas.microsoft.com/office/powerpoint/2010/main" val="341325883"/>
+      </p:ext>
+    </p:extLst>
+  </p:cSld>
+  <p:clrMapOvr>
+    <a:masterClrMapping/>
+  </p:clrMapOvr>
+</p:sld>
+</file>
+
+<file path=ppt/slides/slide7.xml><?xml version="1.0" encoding="utf-8"?>
+<p:sld xmlns:a="http://schemas.openxmlformats.org/drawingml/2006/main" xmlns:r="http://schemas.openxmlformats.org/officeDocument/2006/relationships" xmlns:p="http://schemas.openxmlformats.org/presentationml/2006/main">
+  <p:cSld>
+    <p:spTree>
+      <p:nvGrpSpPr>
+        <p:cNvPr id="1" name=""/>
+        <p:cNvGrpSpPr/>
+        <p:nvPr/>
+      </p:nvGrpSpPr>
+      <p:grpSpPr>
+        <a:xfrm>
+          <a:off x="0" y="0"/>
+          <a:ext cx="0" cy="0"/>
+          <a:chOff x="0" y="0"/>
+          <a:chExt cx="0" cy="0"/>
+        </a:xfrm>
+      </p:grpSpPr>
+      <p:sp>
+        <p:nvSpPr>
           <p:cNvPr id="5" name="Espace réservé du contenu 4"/>
           <p:cNvSpPr>
             <a:spLocks noGrp="1"/>
@@ -15174,7 +15426,7 @@
 </p:sld>
 </file>
 
-<file path=ppt/slides/slide6.xml><?xml version="1.0" encoding="utf-8"?>
+<file path=ppt/slides/slide8.xml><?xml version="1.0" encoding="utf-8"?>
 <p:sld xmlns:a="http://schemas.openxmlformats.org/drawingml/2006/main" xmlns:r="http://schemas.openxmlformats.org/officeDocument/2006/relationships" xmlns:p="http://schemas.openxmlformats.org/presentationml/2006/main">
   <p:cSld>
     <p:spTree>
@@ -15314,7 +15566,7 @@
 </p:sld>
 </file>
 
-<file path=ppt/slides/slide7.xml><?xml version="1.0" encoding="utf-8"?>
+<file path=ppt/slides/slide9.xml><?xml version="1.0" encoding="utf-8"?>
 <p:sld xmlns:a="http://schemas.openxmlformats.org/drawingml/2006/main" xmlns:r="http://schemas.openxmlformats.org/officeDocument/2006/relationships" xmlns:p="http://schemas.openxmlformats.org/presentationml/2006/main">
   <p:cSld>
     <p:spTree>

</xml_diff>

<commit_message>
Add clement part in slide
</commit_message>
<xml_diff>
--- a/Presentation.pptx
+++ b/Presentation.pptx
@@ -9,11 +9,18 @@
     <p:sldId id="257" r:id="rId3"/>
     <p:sldId id="265" r:id="rId4"/>
     <p:sldId id="266" r:id="rId5"/>
-    <p:sldId id="269" r:id="rId6"/>
-    <p:sldId id="270" r:id="rId7"/>
-    <p:sldId id="267" r:id="rId8"/>
-    <p:sldId id="268" r:id="rId9"/>
-    <p:sldId id="264" r:id="rId10"/>
+    <p:sldId id="271" r:id="rId6"/>
+    <p:sldId id="272" r:id="rId7"/>
+    <p:sldId id="273" r:id="rId8"/>
+    <p:sldId id="274" r:id="rId9"/>
+    <p:sldId id="275" r:id="rId10"/>
+    <p:sldId id="276" r:id="rId11"/>
+    <p:sldId id="277" r:id="rId12"/>
+    <p:sldId id="269" r:id="rId13"/>
+    <p:sldId id="270" r:id="rId14"/>
+    <p:sldId id="267" r:id="rId15"/>
+    <p:sldId id="268" r:id="rId16"/>
+    <p:sldId id="264" r:id="rId17"/>
   </p:sldIdLst>
   <p:sldSz cx="9144000" cy="6858000" type="screen4x3"/>
   <p:notesSz cx="6858000" cy="9144000"/>
@@ -14664,6 +14671,835 @@
 </p:sld>
 </file>
 
+<file path=ppt/slides/slide10.xml><?xml version="1.0" encoding="utf-8"?>
+<p:sld xmlns:a="http://schemas.openxmlformats.org/drawingml/2006/main" xmlns:r="http://schemas.openxmlformats.org/officeDocument/2006/relationships" xmlns:p="http://schemas.openxmlformats.org/presentationml/2006/main">
+  <p:cSld>
+    <p:spTree>
+      <p:nvGrpSpPr>
+        <p:cNvPr id="1" name=""/>
+        <p:cNvGrpSpPr/>
+        <p:nvPr/>
+      </p:nvGrpSpPr>
+      <p:grpSpPr>
+        <a:xfrm>
+          <a:off x="0" y="0"/>
+          <a:ext cx="0" cy="0"/>
+          <a:chOff x="0" y="0"/>
+          <a:chExt cx="0" cy="0"/>
+        </a:xfrm>
+      </p:grpSpPr>
+      <p:sp>
+        <p:nvSpPr>
+          <p:cNvPr id="2" name="Espace réservé du contenu 1"/>
+          <p:cNvSpPr>
+            <a:spLocks noGrp="1"/>
+          </p:cNvSpPr>
+          <p:nvPr>
+            <p:ph idx="1"/>
+          </p:nvPr>
+        </p:nvSpPr>
+        <p:spPr>
+          <a:xfrm>
+            <a:off x="5482915" y="2675467"/>
+            <a:ext cx="3453927" cy="3450696"/>
+          </a:xfrm>
+        </p:spPr>
+        <p:txBody>
+          <a:bodyPr>
+            <a:normAutofit/>
+          </a:bodyPr>
+          <a:lstStyle/>
+          <a:p>
+            <a:r>
+              <a:rPr lang="en-GB" smtClean="0"/>
+              <a:t>View your article in context</a:t>
+            </a:r>
+            <a:endParaRPr lang="en-GB"/>
+          </a:p>
+        </p:txBody>
+      </p:sp>
+      <p:sp>
+        <p:nvSpPr>
+          <p:cNvPr id="3" name="Titre 2"/>
+          <p:cNvSpPr>
+            <a:spLocks noGrp="1"/>
+          </p:cNvSpPr>
+          <p:nvPr>
+            <p:ph type="title"/>
+          </p:nvPr>
+        </p:nvSpPr>
+        <p:spPr/>
+        <p:txBody>
+          <a:bodyPr/>
+          <a:lstStyle/>
+          <a:p>
+            <a:r>
+              <a:rPr lang="en-GB" smtClean="0"/>
+              <a:t>Create an article</a:t>
+            </a:r>
+            <a:endParaRPr lang="en-GB"/>
+          </a:p>
+        </p:txBody>
+      </p:sp>
+      <p:pic>
+        <p:nvPicPr>
+          <p:cNvPr id="4" name="Image 3"/>
+          <p:cNvPicPr>
+            <a:picLocks noChangeAspect="1"/>
+          </p:cNvPicPr>
+          <p:nvPr/>
+        </p:nvPicPr>
+        <p:blipFill>
+          <a:blip r:embed="rId2"/>
+          <a:stretch>
+            <a:fillRect/>
+          </a:stretch>
+        </p:blipFill>
+        <p:spPr>
+          <a:xfrm>
+            <a:off x="220610" y="2416370"/>
+            <a:ext cx="5138394" cy="4112477"/>
+          </a:xfrm>
+          <a:prstGeom prst="rect">
+            <a:avLst/>
+          </a:prstGeom>
+        </p:spPr>
+      </p:pic>
+    </p:spTree>
+    <p:extLst>
+      <p:ext uri="{BB962C8B-B14F-4D97-AF65-F5344CB8AC3E}">
+        <p14:creationId xmlns:p14="http://schemas.microsoft.com/office/powerpoint/2010/main" val="120097881"/>
+      </p:ext>
+    </p:extLst>
+  </p:cSld>
+  <p:clrMapOvr>
+    <a:masterClrMapping/>
+  </p:clrMapOvr>
+</p:sld>
+</file>
+
+<file path=ppt/slides/slide11.xml><?xml version="1.0" encoding="utf-8"?>
+<p:sld xmlns:a="http://schemas.openxmlformats.org/drawingml/2006/main" xmlns:r="http://schemas.openxmlformats.org/officeDocument/2006/relationships" xmlns:p="http://schemas.openxmlformats.org/presentationml/2006/main">
+  <p:cSld>
+    <p:spTree>
+      <p:nvGrpSpPr>
+        <p:cNvPr id="1" name=""/>
+        <p:cNvGrpSpPr/>
+        <p:nvPr/>
+      </p:nvGrpSpPr>
+      <p:grpSpPr>
+        <a:xfrm>
+          <a:off x="0" y="0"/>
+          <a:ext cx="0" cy="0"/>
+          <a:chOff x="0" y="0"/>
+          <a:chExt cx="0" cy="0"/>
+        </a:xfrm>
+      </p:grpSpPr>
+      <p:sp>
+        <p:nvSpPr>
+          <p:cNvPr id="2" name="Espace réservé du contenu 1"/>
+          <p:cNvSpPr>
+            <a:spLocks noGrp="1"/>
+          </p:cNvSpPr>
+          <p:nvPr>
+            <p:ph idx="1"/>
+          </p:nvPr>
+        </p:nvSpPr>
+        <p:spPr>
+          <a:xfrm>
+            <a:off x="368300" y="2675467"/>
+            <a:ext cx="7912100" cy="1329580"/>
+          </a:xfrm>
+        </p:spPr>
+        <p:txBody>
+          <a:bodyPr/>
+          <a:lstStyle/>
+          <a:p>
+            <a:r>
+              <a:rPr lang="en-GB" smtClean="0"/>
+              <a:t>Multimedia support</a:t>
+            </a:r>
+            <a:endParaRPr lang="en-GB"/>
+          </a:p>
+        </p:txBody>
+      </p:sp>
+      <p:sp>
+        <p:nvSpPr>
+          <p:cNvPr id="3" name="Titre 2"/>
+          <p:cNvSpPr>
+            <a:spLocks noGrp="1"/>
+          </p:cNvSpPr>
+          <p:nvPr>
+            <p:ph type="title"/>
+          </p:nvPr>
+        </p:nvSpPr>
+        <p:spPr/>
+        <p:txBody>
+          <a:bodyPr/>
+          <a:lstStyle/>
+          <a:p>
+            <a:r>
+              <a:rPr lang="en-GB" smtClean="0"/>
+              <a:t>Create an article</a:t>
+            </a:r>
+            <a:endParaRPr lang="en-GB"/>
+          </a:p>
+        </p:txBody>
+      </p:sp>
+      <p:pic>
+        <p:nvPicPr>
+          <p:cNvPr id="4" name="Image 3"/>
+          <p:cNvPicPr>
+            <a:picLocks noChangeAspect="1"/>
+          </p:cNvPicPr>
+          <p:nvPr/>
+        </p:nvPicPr>
+        <p:blipFill>
+          <a:blip r:embed="rId2"/>
+          <a:stretch>
+            <a:fillRect/>
+          </a:stretch>
+        </p:blipFill>
+        <p:spPr>
+          <a:xfrm>
+            <a:off x="368300" y="4005047"/>
+            <a:ext cx="7912100" cy="2552700"/>
+          </a:xfrm>
+          <a:prstGeom prst="rect">
+            <a:avLst/>
+          </a:prstGeom>
+        </p:spPr>
+      </p:pic>
+    </p:spTree>
+    <p:extLst>
+      <p:ext uri="{BB962C8B-B14F-4D97-AF65-F5344CB8AC3E}">
+        <p14:creationId xmlns:p14="http://schemas.microsoft.com/office/powerpoint/2010/main" val="1704238323"/>
+      </p:ext>
+    </p:extLst>
+  </p:cSld>
+  <p:clrMapOvr>
+    <a:masterClrMapping/>
+  </p:clrMapOvr>
+</p:sld>
+</file>
+
+<file path=ppt/slides/slide12.xml><?xml version="1.0" encoding="utf-8"?>
+<p:sld xmlns:a="http://schemas.openxmlformats.org/drawingml/2006/main" xmlns:r="http://schemas.openxmlformats.org/officeDocument/2006/relationships" xmlns:p="http://schemas.openxmlformats.org/presentationml/2006/main">
+  <p:cSld>
+    <p:spTree>
+      <p:nvGrpSpPr>
+        <p:cNvPr id="1" name=""/>
+        <p:cNvGrpSpPr/>
+        <p:nvPr/>
+      </p:nvGrpSpPr>
+      <p:grpSpPr>
+        <a:xfrm>
+          <a:off x="0" y="0"/>
+          <a:ext cx="0" cy="0"/>
+          <a:chOff x="0" y="0"/>
+          <a:chExt cx="0" cy="0"/>
+        </a:xfrm>
+      </p:grpSpPr>
+      <p:sp>
+        <p:nvSpPr>
+          <p:cNvPr id="2" name="Espace réservé du contenu 1"/>
+          <p:cNvSpPr>
+            <a:spLocks noGrp="1"/>
+          </p:cNvSpPr>
+          <p:nvPr>
+            <p:ph idx="1"/>
+          </p:nvPr>
+        </p:nvSpPr>
+        <p:spPr/>
+        <p:txBody>
+          <a:bodyPr/>
+          <a:lstStyle/>
+          <a:p>
+            <a:r>
+              <a:rPr lang="en-GB" smtClean="0"/>
+              <a:t>Choose your theme</a:t>
+            </a:r>
+          </a:p>
+          <a:p>
+            <a:r>
+              <a:rPr lang="en-GB" smtClean="0"/>
+              <a:t>Modify it</a:t>
+            </a:r>
+            <a:endParaRPr lang="en-GB"/>
+          </a:p>
+        </p:txBody>
+      </p:sp>
+      <p:sp>
+        <p:nvSpPr>
+          <p:cNvPr id="3" name="Titre 2"/>
+          <p:cNvSpPr>
+            <a:spLocks noGrp="1"/>
+          </p:cNvSpPr>
+          <p:nvPr>
+            <p:ph type="title"/>
+          </p:nvPr>
+        </p:nvSpPr>
+        <p:spPr/>
+        <p:txBody>
+          <a:bodyPr/>
+          <a:lstStyle/>
+          <a:p>
+            <a:r>
+              <a:rPr lang="en-GB" smtClean="0"/>
+              <a:t>Pimp your blog !</a:t>
+            </a:r>
+            <a:endParaRPr lang="en-GB"/>
+          </a:p>
+        </p:txBody>
+      </p:sp>
+      <p:pic>
+        <p:nvPicPr>
+          <p:cNvPr id="4" name="Picture 2" descr="C:\Users\utilisateur\Desktop\EnglishProjectBlog\Rapport\Images\ChooseYourTheme.png"/>
+          <p:cNvPicPr>
+            <a:picLocks noChangeAspect="1" noChangeArrowheads="1"/>
+          </p:cNvPicPr>
+          <p:nvPr/>
+        </p:nvPicPr>
+        <p:blipFill>
+          <a:blip r:embed="rId2">
+            <a:extLst>
+              <a:ext uri="{28A0092B-C50C-407E-A947-70E740481C1C}">
+                <a14:useLocalDpi xmlns:a14="http://schemas.microsoft.com/office/drawing/2010/main" val="0"/>
+              </a:ext>
+            </a:extLst>
+          </a:blip>
+          <a:srcRect/>
+          <a:stretch>
+            <a:fillRect/>
+          </a:stretch>
+        </p:blipFill>
+        <p:spPr bwMode="auto">
+          <a:xfrm>
+            <a:off x="4144572" y="2998961"/>
+            <a:ext cx="4662226" cy="3127202"/>
+          </a:xfrm>
+          <a:prstGeom prst="rect">
+            <a:avLst/>
+          </a:prstGeom>
+          <a:noFill/>
+          <a:extLst>
+            <a:ext uri="{909E8E84-426E-40dd-AFC4-6F175D3DCCD1}">
+              <a14:hiddenFill xmlns:a14="http://schemas.microsoft.com/office/drawing/2010/main">
+                <a:solidFill>
+                  <a:srgbClr val="FFFFFF"/>
+                </a:solidFill>
+              </a14:hiddenFill>
+            </a:ext>
+          </a:extLst>
+        </p:spPr>
+      </p:pic>
+    </p:spTree>
+    <p:extLst>
+      <p:ext uri="{BB962C8B-B14F-4D97-AF65-F5344CB8AC3E}">
+        <p14:creationId xmlns:p14="http://schemas.microsoft.com/office/powerpoint/2010/main" val="1868540461"/>
+      </p:ext>
+    </p:extLst>
+  </p:cSld>
+  <p:clrMapOvr>
+    <a:masterClrMapping/>
+  </p:clrMapOvr>
+</p:sld>
+</file>
+
+<file path=ppt/slides/slide13.xml><?xml version="1.0" encoding="utf-8"?>
+<p:sld xmlns:a="http://schemas.openxmlformats.org/drawingml/2006/main" xmlns:r="http://schemas.openxmlformats.org/officeDocument/2006/relationships" xmlns:p="http://schemas.openxmlformats.org/presentationml/2006/main">
+  <p:cSld>
+    <p:spTree>
+      <p:nvGrpSpPr>
+        <p:cNvPr id="1" name=""/>
+        <p:cNvGrpSpPr/>
+        <p:nvPr/>
+      </p:nvGrpSpPr>
+      <p:grpSpPr>
+        <a:xfrm>
+          <a:off x="0" y="0"/>
+          <a:ext cx="0" cy="0"/>
+          <a:chOff x="0" y="0"/>
+          <a:chExt cx="0" cy="0"/>
+        </a:xfrm>
+      </p:grpSpPr>
+      <p:sp>
+        <p:nvSpPr>
+          <p:cNvPr id="5" name="Espace réservé du contenu 4"/>
+          <p:cNvSpPr>
+            <a:spLocks noGrp="1"/>
+          </p:cNvSpPr>
+          <p:nvPr>
+            <p:ph idx="1"/>
+          </p:nvPr>
+        </p:nvSpPr>
+        <p:spPr/>
+        <p:txBody>
+          <a:bodyPr/>
+          <a:lstStyle/>
+          <a:p>
+            <a:r>
+              <a:rPr lang="en-GB" smtClean="0"/>
+              <a:t>Preview it</a:t>
+            </a:r>
+          </a:p>
+          <a:p>
+            <a:r>
+              <a:rPr lang="en-GB" smtClean="0"/>
+              <a:t>Apply it</a:t>
+            </a:r>
+            <a:endParaRPr lang="en-GB"/>
+          </a:p>
+        </p:txBody>
+      </p:sp>
+      <p:sp>
+        <p:nvSpPr>
+          <p:cNvPr id="4" name="Titre 3"/>
+          <p:cNvSpPr>
+            <a:spLocks noGrp="1"/>
+          </p:cNvSpPr>
+          <p:nvPr>
+            <p:ph type="title"/>
+          </p:nvPr>
+        </p:nvSpPr>
+        <p:spPr/>
+        <p:txBody>
+          <a:bodyPr/>
+          <a:lstStyle/>
+          <a:p>
+            <a:r>
+              <a:rPr lang="en-GB" smtClean="0"/>
+              <a:t>Pimp your blog !</a:t>
+            </a:r>
+            <a:endParaRPr lang="en-GB"/>
+          </a:p>
+        </p:txBody>
+      </p:sp>
+      <p:pic>
+        <p:nvPicPr>
+          <p:cNvPr id="6" name="Picture 2" descr="E:\imageDiapo.png"/>
+          <p:cNvPicPr>
+            <a:picLocks noChangeAspect="1" noChangeArrowheads="1"/>
+          </p:cNvPicPr>
+          <p:nvPr/>
+        </p:nvPicPr>
+        <p:blipFill>
+          <a:blip r:embed="rId2">
+            <a:extLst>
+              <a:ext uri="{28A0092B-C50C-407E-A947-70E740481C1C}">
+                <a14:useLocalDpi xmlns:a14="http://schemas.microsoft.com/office/drawing/2010/main" val="0"/>
+              </a:ext>
+            </a:extLst>
+          </a:blip>
+          <a:srcRect/>
+          <a:stretch>
+            <a:fillRect/>
+          </a:stretch>
+        </p:blipFill>
+        <p:spPr bwMode="auto">
+          <a:xfrm>
+            <a:off x="2814911" y="2919053"/>
+            <a:ext cx="6042262" cy="3207110"/>
+          </a:xfrm>
+          <a:prstGeom prst="rect">
+            <a:avLst/>
+          </a:prstGeom>
+          <a:noFill/>
+          <a:extLst>
+            <a:ext uri="{909E8E84-426E-40dd-AFC4-6F175D3DCCD1}">
+              <a14:hiddenFill xmlns:a14="http://schemas.microsoft.com/office/drawing/2010/main">
+                <a:solidFill>
+                  <a:srgbClr val="FFFFFF"/>
+                </a:solidFill>
+              </a14:hiddenFill>
+            </a:ext>
+          </a:extLst>
+        </p:spPr>
+      </p:pic>
+    </p:spTree>
+    <p:extLst>
+      <p:ext uri="{BB962C8B-B14F-4D97-AF65-F5344CB8AC3E}">
+        <p14:creationId xmlns:p14="http://schemas.microsoft.com/office/powerpoint/2010/main" val="341325883"/>
+      </p:ext>
+    </p:extLst>
+  </p:cSld>
+  <p:clrMapOvr>
+    <a:masterClrMapping/>
+  </p:clrMapOvr>
+</p:sld>
+</file>
+
+<file path=ppt/slides/slide14.xml><?xml version="1.0" encoding="utf-8"?>
+<p:sld xmlns:a="http://schemas.openxmlformats.org/drawingml/2006/main" xmlns:r="http://schemas.openxmlformats.org/officeDocument/2006/relationships" xmlns:p="http://schemas.openxmlformats.org/presentationml/2006/main">
+  <p:cSld>
+    <p:spTree>
+      <p:nvGrpSpPr>
+        <p:cNvPr id="1" name=""/>
+        <p:cNvGrpSpPr/>
+        <p:nvPr/>
+      </p:nvGrpSpPr>
+      <p:grpSpPr>
+        <a:xfrm>
+          <a:off x="0" y="0"/>
+          <a:ext cx="0" cy="0"/>
+          <a:chOff x="0" y="0"/>
+          <a:chExt cx="0" cy="0"/>
+        </a:xfrm>
+      </p:grpSpPr>
+      <p:sp>
+        <p:nvSpPr>
+          <p:cNvPr id="5" name="Espace réservé du contenu 4"/>
+          <p:cNvSpPr>
+            <a:spLocks noGrp="1"/>
+          </p:cNvSpPr>
+          <p:nvPr>
+            <p:ph idx="1"/>
+          </p:nvPr>
+        </p:nvSpPr>
+        <p:spPr/>
+        <p:txBody>
+          <a:bodyPr/>
+          <a:lstStyle/>
+          <a:p>
+            <a:r>
+              <a:rPr lang="en-GB" smtClean="0"/>
+              <a:t>It’s beautiful to make a blog.</a:t>
+            </a:r>
+          </a:p>
+          <a:p>
+            <a:r>
+              <a:rPr lang="en-GB" smtClean="0"/>
+              <a:t>But without reader, is it joyous ?</a:t>
+            </a:r>
+          </a:p>
+          <a:p>
+            <a:r>
+              <a:rPr lang="en-GB" smtClean="0"/>
+              <a:t>Share it !</a:t>
+            </a:r>
+          </a:p>
+          <a:p>
+            <a:r>
+              <a:rPr lang="en-GB" smtClean="0"/>
+              <a:t>Like it !</a:t>
+            </a:r>
+          </a:p>
+          <a:p>
+            <a:endParaRPr lang="en-GB"/>
+          </a:p>
+        </p:txBody>
+      </p:sp>
+      <p:sp>
+        <p:nvSpPr>
+          <p:cNvPr id="4" name="Titre 3"/>
+          <p:cNvSpPr>
+            <a:spLocks noGrp="1"/>
+          </p:cNvSpPr>
+          <p:nvPr>
+            <p:ph type="title"/>
+          </p:nvPr>
+        </p:nvSpPr>
+        <p:spPr/>
+        <p:txBody>
+          <a:bodyPr/>
+          <a:lstStyle/>
+          <a:p>
+            <a:r>
+              <a:rPr lang="en-GB" smtClean="0"/>
+              <a:t>Share it to let it know !</a:t>
+            </a:r>
+            <a:endParaRPr lang="en-GB"/>
+          </a:p>
+        </p:txBody>
+      </p:sp>
+      <p:pic>
+        <p:nvPicPr>
+          <p:cNvPr id="6" name="Picture 4" descr="F:\GitHub\EnglishProjectBlog\Rapport\Images\blogBar.png"/>
+          <p:cNvPicPr>
+            <a:picLocks noChangeAspect="1" noChangeArrowheads="1"/>
+          </p:cNvPicPr>
+          <p:nvPr/>
+        </p:nvPicPr>
+        <p:blipFill>
+          <a:blip r:embed="rId2">
+            <a:extLst>
+              <a:ext uri="{28A0092B-C50C-407E-A947-70E740481C1C}">
+                <a14:useLocalDpi xmlns:a14="http://schemas.microsoft.com/office/drawing/2010/main" val="0"/>
+              </a:ext>
+            </a:extLst>
+          </a:blip>
+          <a:srcRect/>
+          <a:stretch>
+            <a:fillRect/>
+          </a:stretch>
+        </p:blipFill>
+        <p:spPr bwMode="auto">
+          <a:xfrm>
+            <a:off x="5752115" y="3602537"/>
+            <a:ext cx="2714625" cy="390525"/>
+          </a:xfrm>
+          <a:prstGeom prst="rect">
+            <a:avLst/>
+          </a:prstGeom>
+          <a:noFill/>
+          <a:extLst>
+            <a:ext uri="{909E8E84-426E-40dd-AFC4-6F175D3DCCD1}">
+              <a14:hiddenFill xmlns:a14="http://schemas.microsoft.com/office/drawing/2010/main">
+                <a:solidFill>
+                  <a:srgbClr val="FFFFFF"/>
+                </a:solidFill>
+              </a14:hiddenFill>
+            </a:ext>
+          </a:extLst>
+        </p:spPr>
+      </p:pic>
+      <p:pic>
+        <p:nvPicPr>
+          <p:cNvPr id="7" name="Picture 3" descr="F:\GitHub\EnglishProjectBlog\Rapport\Images\articleBar.png"/>
+          <p:cNvPicPr>
+            <a:picLocks noChangeAspect="1" noChangeArrowheads="1"/>
+          </p:cNvPicPr>
+          <p:nvPr/>
+        </p:nvPicPr>
+        <p:blipFill>
+          <a:blip r:embed="rId3">
+            <a:extLst>
+              <a:ext uri="{28A0092B-C50C-407E-A947-70E740481C1C}">
+                <a14:useLocalDpi xmlns:a14="http://schemas.microsoft.com/office/drawing/2010/main" val="0"/>
+              </a:ext>
+            </a:extLst>
+          </a:blip>
+          <a:srcRect/>
+          <a:stretch>
+            <a:fillRect/>
+          </a:stretch>
+        </p:blipFill>
+        <p:spPr bwMode="auto">
+          <a:xfrm>
+            <a:off x="2554674" y="4041436"/>
+            <a:ext cx="6116638" cy="495300"/>
+          </a:xfrm>
+          <a:prstGeom prst="rect">
+            <a:avLst/>
+          </a:prstGeom>
+          <a:noFill/>
+          <a:extLst>
+            <a:ext uri="{909E8E84-426E-40dd-AFC4-6F175D3DCCD1}">
+              <a14:hiddenFill xmlns:a14="http://schemas.microsoft.com/office/drawing/2010/main">
+                <a:solidFill>
+                  <a:srgbClr val="FFFFFF"/>
+                </a:solidFill>
+              </a14:hiddenFill>
+            </a:ext>
+          </a:extLst>
+        </p:spPr>
+      </p:pic>
+    </p:spTree>
+    <p:extLst>
+      <p:ext uri="{BB962C8B-B14F-4D97-AF65-F5344CB8AC3E}">
+        <p14:creationId xmlns:p14="http://schemas.microsoft.com/office/powerpoint/2010/main" val="2864803881"/>
+      </p:ext>
+    </p:extLst>
+  </p:cSld>
+  <p:clrMapOvr>
+    <a:masterClrMapping/>
+  </p:clrMapOvr>
+</p:sld>
+</file>
+
+<file path=ppt/slides/slide15.xml><?xml version="1.0" encoding="utf-8"?>
+<p:sld xmlns:a="http://schemas.openxmlformats.org/drawingml/2006/main" xmlns:r="http://schemas.openxmlformats.org/officeDocument/2006/relationships" xmlns:p="http://schemas.openxmlformats.org/presentationml/2006/main">
+  <p:cSld>
+    <p:spTree>
+      <p:nvGrpSpPr>
+        <p:cNvPr id="1" name=""/>
+        <p:cNvGrpSpPr/>
+        <p:nvPr/>
+      </p:nvGrpSpPr>
+      <p:grpSpPr>
+        <a:xfrm>
+          <a:off x="0" y="0"/>
+          <a:ext cx="0" cy="0"/>
+          <a:chOff x="0" y="0"/>
+          <a:chExt cx="0" cy="0"/>
+        </a:xfrm>
+      </p:grpSpPr>
+      <p:sp>
+        <p:nvSpPr>
+          <p:cNvPr id="2" name="Espace réservé du contenu 1"/>
+          <p:cNvSpPr>
+            <a:spLocks noGrp="1"/>
+          </p:cNvSpPr>
+          <p:nvPr>
+            <p:ph idx="1"/>
+          </p:nvPr>
+        </p:nvSpPr>
+        <p:spPr>
+          <a:xfrm>
+            <a:off x="872067" y="2675466"/>
+            <a:ext cx="5385271" cy="3706229"/>
+          </a:xfrm>
+        </p:spPr>
+        <p:txBody>
+          <a:bodyPr anchor="ctr"/>
+          <a:lstStyle/>
+          <a:p>
+            <a:r>
+              <a:rPr lang="en-GB" smtClean="0"/>
+              <a:t>Write a lot of articles bored you ?</a:t>
+            </a:r>
+          </a:p>
+          <a:p>
+            <a:r>
+              <a:rPr lang="en-GB" smtClean="0"/>
+              <a:t>You can automatically use your facebook publications.</a:t>
+            </a:r>
+          </a:p>
+          <a:p>
+            <a:r>
+              <a:rPr lang="en-GB" smtClean="0"/>
+              <a:t>So let all this people know your personal life.</a:t>
+            </a:r>
+          </a:p>
+          <a:p>
+            <a:r>
+              <a:rPr lang="en-GB" smtClean="0"/>
+              <a:t>Just click on the deadly button and take care of your boss.</a:t>
+            </a:r>
+            <a:endParaRPr lang="en-GB"/>
+          </a:p>
+        </p:txBody>
+      </p:sp>
+      <p:sp>
+        <p:nvSpPr>
+          <p:cNvPr id="3" name="Titre 2"/>
+          <p:cNvSpPr>
+            <a:spLocks noGrp="1"/>
+          </p:cNvSpPr>
+          <p:nvPr>
+            <p:ph type="title"/>
+          </p:nvPr>
+        </p:nvSpPr>
+        <p:spPr/>
+        <p:txBody>
+          <a:bodyPr/>
+          <a:lstStyle/>
+          <a:p>
+            <a:r>
+              <a:rPr lang="en-GB" smtClean="0"/>
+              <a:t>Feed it !</a:t>
+            </a:r>
+            <a:endParaRPr lang="en-GB"/>
+          </a:p>
+        </p:txBody>
+      </p:sp>
+      <p:pic>
+        <p:nvPicPr>
+          <p:cNvPr id="4" name="Picture 2" descr="F:\GitHub\EnglishProjectBlog\Rapport\Images\shareIni.png"/>
+          <p:cNvPicPr>
+            <a:picLocks noChangeAspect="1" noChangeArrowheads="1"/>
+          </p:cNvPicPr>
+          <p:nvPr/>
+        </p:nvPicPr>
+        <p:blipFill>
+          <a:blip r:embed="rId2">
+            <a:extLst>
+              <a:ext uri="{28A0092B-C50C-407E-A947-70E740481C1C}">
+                <a14:useLocalDpi xmlns:a14="http://schemas.microsoft.com/office/drawing/2010/main" val="0"/>
+              </a:ext>
+            </a:extLst>
+          </a:blip>
+          <a:srcRect/>
+          <a:stretch>
+            <a:fillRect/>
+          </a:stretch>
+        </p:blipFill>
+        <p:spPr bwMode="auto">
+          <a:xfrm>
+            <a:off x="6660232" y="2675466"/>
+            <a:ext cx="2232248" cy="4012352"/>
+          </a:xfrm>
+          <a:prstGeom prst="rect">
+            <a:avLst/>
+          </a:prstGeom>
+          <a:noFill/>
+          <a:extLst>
+            <a:ext uri="{909E8E84-426E-40dd-AFC4-6F175D3DCCD1}">
+              <a14:hiddenFill xmlns:a14="http://schemas.microsoft.com/office/drawing/2010/main">
+                <a:solidFill>
+                  <a:srgbClr val="FFFFFF"/>
+                </a:solidFill>
+              </a14:hiddenFill>
+            </a:ext>
+          </a:extLst>
+        </p:spPr>
+      </p:pic>
+    </p:spTree>
+    <p:extLst>
+      <p:ext uri="{BB962C8B-B14F-4D97-AF65-F5344CB8AC3E}">
+        <p14:creationId xmlns:p14="http://schemas.microsoft.com/office/powerpoint/2010/main" val="354734717"/>
+      </p:ext>
+    </p:extLst>
+  </p:cSld>
+  <p:clrMapOvr>
+    <a:masterClrMapping/>
+  </p:clrMapOvr>
+</p:sld>
+</file>
+
+<file path=ppt/slides/slide16.xml><?xml version="1.0" encoding="utf-8"?>
+<p:sld xmlns:a="http://schemas.openxmlformats.org/drawingml/2006/main" xmlns:r="http://schemas.openxmlformats.org/officeDocument/2006/relationships" xmlns:p="http://schemas.openxmlformats.org/presentationml/2006/main">
+  <p:cSld>
+    <p:spTree>
+      <p:nvGrpSpPr>
+        <p:cNvPr id="1" name=""/>
+        <p:cNvGrpSpPr/>
+        <p:nvPr/>
+      </p:nvGrpSpPr>
+      <p:grpSpPr>
+        <a:xfrm>
+          <a:off x="0" y="0"/>
+          <a:ext cx="0" cy="0"/>
+          <a:chOff x="0" y="0"/>
+          <a:chExt cx="0" cy="0"/>
+        </a:xfrm>
+      </p:grpSpPr>
+      <p:sp>
+        <p:nvSpPr>
+          <p:cNvPr id="2" name="Titre 1"/>
+          <p:cNvSpPr>
+            <a:spLocks noGrp="1"/>
+          </p:cNvSpPr>
+          <p:nvPr>
+            <p:ph type="title"/>
+          </p:nvPr>
+        </p:nvSpPr>
+        <p:spPr/>
+        <p:txBody>
+          <a:bodyPr/>
+          <a:lstStyle/>
+          <a:p>
+            <a:r>
+              <a:rPr lang="fr-FR" dirty="0" smtClean="0"/>
+              <a:t>Conclusion</a:t>
+            </a:r>
+            <a:endParaRPr lang="fr-FR" dirty="0"/>
+          </a:p>
+        </p:txBody>
+      </p:sp>
+    </p:spTree>
+    <p:extLst>
+      <p:ext uri="{BB962C8B-B14F-4D97-AF65-F5344CB8AC3E}">
+        <p14:creationId xmlns:p14="http://schemas.microsoft.com/office/powerpoint/2010/main" val="1565431838"/>
+      </p:ext>
+    </p:extLst>
+  </p:cSld>
+  <p:clrMapOvr>
+    <a:masterClrMapping/>
+  </p:clrMapOvr>
+</p:sld>
+</file>
+
 <file path=ppt/slides/slide2.xml><?xml version="1.0" encoding="utf-8"?>
 <p:sld xmlns:a="http://schemas.openxmlformats.org/drawingml/2006/main" xmlns:r="http://schemas.openxmlformats.org/officeDocument/2006/relationships" xmlns:p="http://schemas.openxmlformats.org/presentationml/2006/main">
   <p:cSld>
@@ -15029,20 +15865,19 @@
             <p:ph idx="1"/>
           </p:nvPr>
         </p:nvSpPr>
-        <p:spPr/>
+        <p:spPr>
+          <a:xfrm>
+            <a:off x="5978546" y="2675467"/>
+            <a:ext cx="2958296" cy="3985040"/>
+          </a:xfrm>
+        </p:spPr>
         <p:txBody>
           <a:bodyPr/>
           <a:lstStyle/>
           <a:p>
             <a:r>
               <a:rPr lang="en-GB" smtClean="0"/>
-              <a:t>Choose your theme</a:t>
-            </a:r>
-          </a:p>
-          <a:p>
-            <a:r>
-              <a:rPr lang="en-GB" smtClean="0"/>
-              <a:t>Modify it</a:t>
+              <a:t>A quick post</a:t>
             </a:r>
             <a:endParaRPr lang="en-GB"/>
           </a:p>
@@ -15060,12 +15895,14 @@
         </p:nvSpPr>
         <p:spPr/>
         <p:txBody>
-          <a:bodyPr/>
+          <a:bodyPr>
+            <a:normAutofit/>
+          </a:bodyPr>
           <a:lstStyle/>
           <a:p>
             <a:r>
               <a:rPr lang="en-GB" smtClean="0"/>
-              <a:t>Pimp your blog !</a:t>
+              <a:t>Create an article</a:t>
             </a:r>
             <a:endParaRPr lang="en-GB"/>
           </a:p>
@@ -15073,49 +15910,32 @@
       </p:sp>
       <p:pic>
         <p:nvPicPr>
-          <p:cNvPr id="4" name="Picture 2" descr="C:\Users\utilisateur\Desktop\EnglishProjectBlog\Rapport\Images\ChooseYourTheme.png"/>
+          <p:cNvPr id="5" name="Image 4"/>
           <p:cNvPicPr>
-            <a:picLocks noChangeAspect="1" noChangeArrowheads="1"/>
+            <a:picLocks noChangeAspect="1"/>
           </p:cNvPicPr>
           <p:nvPr/>
         </p:nvPicPr>
         <p:blipFill>
-          <a:blip r:embed="rId2">
-            <a:extLst>
-              <a:ext uri="{28A0092B-C50C-407E-A947-70E740481C1C}">
-                <a14:useLocalDpi xmlns:a14="http://schemas.microsoft.com/office/drawing/2010/main" val="0"/>
-              </a:ext>
-            </a:extLst>
-          </a:blip>
-          <a:srcRect/>
+          <a:blip r:embed="rId2"/>
           <a:stretch>
             <a:fillRect/>
           </a:stretch>
         </p:blipFill>
-        <p:spPr bwMode="auto">
+        <p:spPr>
           <a:xfrm>
-            <a:off x="4144572" y="2998961"/>
-            <a:ext cx="4662226" cy="3127202"/>
+            <a:off x="251571" y="2675466"/>
+            <a:ext cx="5559512" cy="3985041"/>
           </a:xfrm>
           <a:prstGeom prst="rect">
             <a:avLst/>
           </a:prstGeom>
-          <a:noFill/>
-          <a:extLst>
-            <a:ext uri="{909E8E84-426E-40dd-AFC4-6F175D3DCCD1}">
-              <a14:hiddenFill xmlns:a14="http://schemas.microsoft.com/office/drawing/2010/main">
-                <a:solidFill>
-                  <a:srgbClr val="FFFFFF"/>
-                </a:solidFill>
-              </a14:hiddenFill>
-            </a:ext>
-          </a:extLst>
         </p:spPr>
       </p:pic>
     </p:spTree>
     <p:extLst>
       <p:ext uri="{BB962C8B-B14F-4D97-AF65-F5344CB8AC3E}">
-        <p14:creationId xmlns:p14="http://schemas.microsoft.com/office/powerpoint/2010/main" val="1868540461"/>
+        <p14:creationId xmlns:p14="http://schemas.microsoft.com/office/powerpoint/2010/main" val="1800564781"/>
       </p:ext>
     </p:extLst>
   </p:cSld>
@@ -15144,7 +15964,7 @@
       </p:grpSpPr>
       <p:sp>
         <p:nvSpPr>
-          <p:cNvPr id="5" name="Espace réservé du contenu 4"/>
+          <p:cNvPr id="2" name="Espace réservé du contenu 1"/>
           <p:cNvSpPr>
             <a:spLocks noGrp="1"/>
           </p:cNvSpPr>
@@ -15152,20 +15972,19 @@
             <p:ph idx="1"/>
           </p:nvPr>
         </p:nvSpPr>
-        <p:spPr/>
+        <p:spPr>
+          <a:xfrm>
+            <a:off x="329971" y="2146709"/>
+            <a:ext cx="3913867" cy="1057515"/>
+          </a:xfrm>
+        </p:spPr>
         <p:txBody>
           <a:bodyPr/>
           <a:lstStyle/>
           <a:p>
             <a:r>
               <a:rPr lang="en-GB" smtClean="0"/>
-              <a:t>Preview it</a:t>
-            </a:r>
-          </a:p>
-          <a:p>
-            <a:r>
-              <a:rPr lang="en-GB" smtClean="0"/>
-              <a:t>Apply it</a:t>
+              <a:t>Writing a basic post</a:t>
             </a:r>
             <a:endParaRPr lang="en-GB"/>
           </a:p>
@@ -15173,7 +15992,7 @@
       </p:sp>
       <p:sp>
         <p:nvSpPr>
-          <p:cNvPr id="4" name="Titre 3"/>
+          <p:cNvPr id="3" name="Titre 2"/>
           <p:cNvSpPr>
             <a:spLocks noGrp="1"/>
           </p:cNvSpPr>
@@ -15188,7 +16007,7 @@
           <a:p>
             <a:r>
               <a:rPr lang="en-GB" smtClean="0"/>
-              <a:t>Pimp your blog !</a:t>
+              <a:t>Create an article</a:t>
             </a:r>
             <a:endParaRPr lang="en-GB"/>
           </a:p>
@@ -15196,49 +16015,32 @@
       </p:sp>
       <p:pic>
         <p:nvPicPr>
-          <p:cNvPr id="6" name="Picture 2" descr="E:\imageDiapo.png"/>
+          <p:cNvPr id="4" name="Image 3"/>
           <p:cNvPicPr>
-            <a:picLocks noChangeAspect="1" noChangeArrowheads="1"/>
+            <a:picLocks noChangeAspect="1"/>
           </p:cNvPicPr>
           <p:nvPr/>
         </p:nvPicPr>
         <p:blipFill>
-          <a:blip r:embed="rId2">
-            <a:extLst>
-              <a:ext uri="{28A0092B-C50C-407E-A947-70E740481C1C}">
-                <a14:useLocalDpi xmlns:a14="http://schemas.microsoft.com/office/drawing/2010/main" val="0"/>
-              </a:ext>
-            </a:extLst>
-          </a:blip>
-          <a:srcRect/>
+          <a:blip r:embed="rId2"/>
           <a:stretch>
             <a:fillRect/>
           </a:stretch>
         </p:blipFill>
-        <p:spPr bwMode="auto">
+        <p:spPr>
           <a:xfrm>
-            <a:off x="2814911" y="2919053"/>
-            <a:ext cx="6042262" cy="3207110"/>
+            <a:off x="1000823" y="3204224"/>
+            <a:ext cx="7784921" cy="3167658"/>
           </a:xfrm>
           <a:prstGeom prst="rect">
             <a:avLst/>
           </a:prstGeom>
-          <a:noFill/>
-          <a:extLst>
-            <a:ext uri="{909E8E84-426E-40dd-AFC4-6F175D3DCCD1}">
-              <a14:hiddenFill xmlns:a14="http://schemas.microsoft.com/office/drawing/2010/main">
-                <a:solidFill>
-                  <a:srgbClr val="FFFFFF"/>
-                </a:solidFill>
-              </a14:hiddenFill>
-            </a:ext>
-          </a:extLst>
         </p:spPr>
       </p:pic>
     </p:spTree>
     <p:extLst>
       <p:ext uri="{BB962C8B-B14F-4D97-AF65-F5344CB8AC3E}">
-        <p14:creationId xmlns:p14="http://schemas.microsoft.com/office/powerpoint/2010/main" val="341325883"/>
+        <p14:creationId xmlns:p14="http://schemas.microsoft.com/office/powerpoint/2010/main" val="1269455725"/>
       </p:ext>
     </p:extLst>
   </p:cSld>
@@ -15267,7 +16069,7 @@
       </p:grpSpPr>
       <p:sp>
         <p:nvSpPr>
-          <p:cNvPr id="5" name="Espace réservé du contenu 4"/>
+          <p:cNvPr id="2" name="Espace réservé du contenu 1"/>
           <p:cNvSpPr>
             <a:spLocks noGrp="1"/>
           </p:cNvSpPr>
@@ -15275,42 +16077,27 @@
             <p:ph idx="1"/>
           </p:nvPr>
         </p:nvSpPr>
-        <p:spPr/>
+        <p:spPr>
+          <a:xfrm>
+            <a:off x="5746750" y="2972095"/>
+            <a:ext cx="2940050" cy="946762"/>
+          </a:xfrm>
+        </p:spPr>
         <p:txBody>
           <a:bodyPr/>
           <a:lstStyle/>
           <a:p>
             <a:r>
               <a:rPr lang="en-GB" smtClean="0"/>
-              <a:t>It’s beautiful to make a blog.</a:t>
+              <a:t>A real article</a:t>
             </a:r>
-          </a:p>
-          <a:p>
-            <a:r>
-              <a:rPr lang="en-GB" smtClean="0"/>
-              <a:t>But without reader, is it joyous ?</a:t>
-            </a:r>
-          </a:p>
-          <a:p>
-            <a:r>
-              <a:rPr lang="en-GB" smtClean="0"/>
-              <a:t>Share it !</a:t>
-            </a:r>
-          </a:p>
-          <a:p>
-            <a:r>
-              <a:rPr lang="en-GB" smtClean="0"/>
-              <a:t>Like it !</a:t>
-            </a:r>
-          </a:p>
-          <a:p>
             <a:endParaRPr lang="en-GB"/>
           </a:p>
         </p:txBody>
       </p:sp>
       <p:sp>
         <p:nvSpPr>
-          <p:cNvPr id="4" name="Titre 3"/>
+          <p:cNvPr id="3" name="Titre 2"/>
           <p:cNvSpPr>
             <a:spLocks noGrp="1"/>
           </p:cNvSpPr>
@@ -15325,7 +16112,7 @@
           <a:p>
             <a:r>
               <a:rPr lang="en-GB" smtClean="0"/>
-              <a:t>Share it to let it know !</a:t>
+              <a:t>Create an article</a:t>
             </a:r>
             <a:endParaRPr lang="en-GB"/>
           </a:p>
@@ -15333,90 +16120,32 @@
       </p:sp>
       <p:pic>
         <p:nvPicPr>
-          <p:cNvPr id="6" name="Picture 4" descr="F:\GitHub\EnglishProjectBlog\Rapport\Images\blogBar.png"/>
+          <p:cNvPr id="4" name="Image 3"/>
           <p:cNvPicPr>
-            <a:picLocks noChangeAspect="1" noChangeArrowheads="1"/>
+            <a:picLocks noChangeAspect="1"/>
           </p:cNvPicPr>
           <p:nvPr/>
         </p:nvPicPr>
         <p:blipFill>
-          <a:blip r:embed="rId2">
-            <a:extLst>
-              <a:ext uri="{28A0092B-C50C-407E-A947-70E740481C1C}">
-                <a14:useLocalDpi xmlns:a14="http://schemas.microsoft.com/office/drawing/2010/main" val="0"/>
-              </a:ext>
-            </a:extLst>
-          </a:blip>
-          <a:srcRect/>
+          <a:blip r:embed="rId2"/>
           <a:stretch>
             <a:fillRect/>
           </a:stretch>
         </p:blipFill>
-        <p:spPr bwMode="auto">
+        <p:spPr>
           <a:xfrm>
-            <a:off x="5752115" y="3602537"/>
-            <a:ext cx="2714625" cy="390525"/>
+            <a:off x="248173" y="2640736"/>
+            <a:ext cx="5276327" cy="3782055"/>
           </a:xfrm>
           <a:prstGeom prst="rect">
             <a:avLst/>
           </a:prstGeom>
-          <a:noFill/>
-          <a:extLst>
-            <a:ext uri="{909E8E84-426E-40dd-AFC4-6F175D3DCCD1}">
-              <a14:hiddenFill xmlns:a14="http://schemas.microsoft.com/office/drawing/2010/main">
-                <a:solidFill>
-                  <a:srgbClr val="FFFFFF"/>
-                </a:solidFill>
-              </a14:hiddenFill>
-            </a:ext>
-          </a:extLst>
-        </p:spPr>
-      </p:pic>
-      <p:pic>
-        <p:nvPicPr>
-          <p:cNvPr id="7" name="Picture 3" descr="F:\GitHub\EnglishProjectBlog\Rapport\Images\articleBar.png"/>
-          <p:cNvPicPr>
-            <a:picLocks noChangeAspect="1" noChangeArrowheads="1"/>
-          </p:cNvPicPr>
-          <p:nvPr/>
-        </p:nvPicPr>
-        <p:blipFill>
-          <a:blip r:embed="rId3">
-            <a:extLst>
-              <a:ext uri="{28A0092B-C50C-407E-A947-70E740481C1C}">
-                <a14:useLocalDpi xmlns:a14="http://schemas.microsoft.com/office/drawing/2010/main" val="0"/>
-              </a:ext>
-            </a:extLst>
-          </a:blip>
-          <a:srcRect/>
-          <a:stretch>
-            <a:fillRect/>
-          </a:stretch>
-        </p:blipFill>
-        <p:spPr bwMode="auto">
-          <a:xfrm>
-            <a:off x="2554674" y="4041436"/>
-            <a:ext cx="6116638" cy="495300"/>
-          </a:xfrm>
-          <a:prstGeom prst="rect">
-            <a:avLst/>
-          </a:prstGeom>
-          <a:noFill/>
-          <a:extLst>
-            <a:ext uri="{909E8E84-426E-40dd-AFC4-6F175D3DCCD1}">
-              <a14:hiddenFill xmlns:a14="http://schemas.microsoft.com/office/drawing/2010/main">
-                <a:solidFill>
-                  <a:srgbClr val="FFFFFF"/>
-                </a:solidFill>
-              </a14:hiddenFill>
-            </a:ext>
-          </a:extLst>
         </p:spPr>
       </p:pic>
     </p:spTree>
     <p:extLst>
       <p:ext uri="{BB962C8B-B14F-4D97-AF65-F5344CB8AC3E}">
-        <p14:creationId xmlns:p14="http://schemas.microsoft.com/office/powerpoint/2010/main" val="2864803881"/>
+        <p14:creationId xmlns:p14="http://schemas.microsoft.com/office/powerpoint/2010/main" val="47160954"/>
       </p:ext>
     </p:extLst>
   </p:cSld>
@@ -15455,35 +16184,17 @@
         </p:nvSpPr>
         <p:spPr>
           <a:xfrm>
-            <a:off x="872067" y="2675466"/>
-            <a:ext cx="5385271" cy="3706229"/>
+            <a:off x="5188634" y="3221827"/>
+            <a:ext cx="3091766" cy="2904336"/>
           </a:xfrm>
         </p:spPr>
         <p:txBody>
-          <a:bodyPr anchor="ctr"/>
+          <a:bodyPr/>
           <a:lstStyle/>
           <a:p>
             <a:r>
               <a:rPr lang="en-GB" smtClean="0"/>
-              <a:t>Write a lot of articles bored you ?</a:t>
-            </a:r>
-          </a:p>
-          <a:p>
-            <a:r>
-              <a:rPr lang="en-GB" smtClean="0"/>
-              <a:t>You can automatically use your facebook publications.</a:t>
-            </a:r>
-          </a:p>
-          <a:p>
-            <a:r>
-              <a:rPr lang="en-GB" smtClean="0"/>
-              <a:t>So let all this people know your personal life.</a:t>
-            </a:r>
-          </a:p>
-          <a:p>
-            <a:r>
-              <a:rPr lang="en-GB" smtClean="0"/>
-              <a:t>Just click on the deadly button and take care of your boss.</a:t>
+              <a:t>Building an article</a:t>
             </a:r>
             <a:endParaRPr lang="en-GB"/>
           </a:p>
@@ -15506,7 +16217,7 @@
           <a:p>
             <a:r>
               <a:rPr lang="en-GB" smtClean="0"/>
-              <a:t>Feed it !</a:t>
+              <a:t>Create an article</a:t>
             </a:r>
             <a:endParaRPr lang="en-GB"/>
           </a:p>
@@ -15514,49 +16225,32 @@
       </p:sp>
       <p:pic>
         <p:nvPicPr>
-          <p:cNvPr id="4" name="Picture 2" descr="F:\GitHub\EnglishProjectBlog\Rapport\Images\shareIni.png"/>
+          <p:cNvPr id="4" name="Image 3"/>
           <p:cNvPicPr>
-            <a:picLocks noChangeAspect="1" noChangeArrowheads="1"/>
+            <a:picLocks noChangeAspect="1"/>
           </p:cNvPicPr>
           <p:nvPr/>
         </p:nvPicPr>
         <p:blipFill>
-          <a:blip r:embed="rId2">
-            <a:extLst>
-              <a:ext uri="{28A0092B-C50C-407E-A947-70E740481C1C}">
-                <a14:useLocalDpi xmlns:a14="http://schemas.microsoft.com/office/drawing/2010/main" val="0"/>
-              </a:ext>
-            </a:extLst>
-          </a:blip>
-          <a:srcRect/>
+          <a:blip r:embed="rId2"/>
           <a:stretch>
             <a:fillRect/>
           </a:stretch>
         </p:blipFill>
-        <p:spPr bwMode="auto">
+        <p:spPr>
           <a:xfrm>
-            <a:off x="6660232" y="2675466"/>
-            <a:ext cx="2232248" cy="4012352"/>
+            <a:off x="245844" y="2314579"/>
+            <a:ext cx="4617533" cy="4187161"/>
           </a:xfrm>
           <a:prstGeom prst="rect">
             <a:avLst/>
           </a:prstGeom>
-          <a:noFill/>
-          <a:extLst>
-            <a:ext uri="{909E8E84-426E-40dd-AFC4-6F175D3DCCD1}">
-              <a14:hiddenFill xmlns:a14="http://schemas.microsoft.com/office/drawing/2010/main">
-                <a:solidFill>
-                  <a:srgbClr val="FFFFFF"/>
-                </a:solidFill>
-              </a14:hiddenFill>
-            </a:ext>
-          </a:extLst>
         </p:spPr>
       </p:pic>
     </p:spTree>
     <p:extLst>
       <p:ext uri="{BB962C8B-B14F-4D97-AF65-F5344CB8AC3E}">
-        <p14:creationId xmlns:p14="http://schemas.microsoft.com/office/powerpoint/2010/main" val="354734717"/>
+        <p14:creationId xmlns:p14="http://schemas.microsoft.com/office/powerpoint/2010/main" val="2340545497"/>
       </p:ext>
     </p:extLst>
   </p:cSld>
@@ -15585,7 +16279,35 @@
       </p:grpSpPr>
       <p:sp>
         <p:nvSpPr>
-          <p:cNvPr id="2" name="Titre 1"/>
+          <p:cNvPr id="2" name="Espace réservé du contenu 1"/>
+          <p:cNvSpPr>
+            <a:spLocks noGrp="1"/>
+          </p:cNvSpPr>
+          <p:nvPr>
+            <p:ph idx="1"/>
+          </p:nvPr>
+        </p:nvSpPr>
+        <p:spPr>
+          <a:xfrm>
+            <a:off x="5018262" y="2675467"/>
+            <a:ext cx="3903092" cy="3450696"/>
+          </a:xfrm>
+        </p:spPr>
+        <p:txBody>
+          <a:bodyPr/>
+          <a:lstStyle/>
+          <a:p>
+            <a:r>
+              <a:rPr lang="en-GB" smtClean="0"/>
+              <a:t>Manage the articles</a:t>
+            </a:r>
+            <a:endParaRPr lang="en-GB"/>
+          </a:p>
+        </p:txBody>
+      </p:sp>
+      <p:sp>
+        <p:nvSpPr>
+          <p:cNvPr id="3" name="Titre 2"/>
           <p:cNvSpPr>
             <a:spLocks noGrp="1"/>
           </p:cNvSpPr>
@@ -15595,21 +16317,47 @@
         </p:nvSpPr>
         <p:spPr/>
         <p:txBody>
-          <a:bodyPr/>
+          <a:bodyPr>
+            <a:normAutofit/>
+          </a:bodyPr>
           <a:lstStyle/>
           <a:p>
             <a:r>
-              <a:rPr lang="fr-FR" dirty="0" smtClean="0"/>
-              <a:t>Conclusion</a:t>
+              <a:rPr lang="en-GB" smtClean="0"/>
+              <a:t>Create an article</a:t>
             </a:r>
-            <a:endParaRPr lang="fr-FR" dirty="0"/>
+            <a:endParaRPr lang="en-GB"/>
           </a:p>
         </p:txBody>
       </p:sp>
+      <p:pic>
+        <p:nvPicPr>
+          <p:cNvPr id="4" name="Image 3"/>
+          <p:cNvPicPr>
+            <a:picLocks noChangeAspect="1"/>
+          </p:cNvPicPr>
+          <p:nvPr/>
+        </p:nvPicPr>
+        <p:blipFill>
+          <a:blip r:embed="rId2"/>
+          <a:stretch>
+            <a:fillRect/>
+          </a:stretch>
+        </p:blipFill>
+        <p:spPr>
+          <a:xfrm>
+            <a:off x="232327" y="2309570"/>
+            <a:ext cx="4635940" cy="4350944"/>
+          </a:xfrm>
+          <a:prstGeom prst="rect">
+            <a:avLst/>
+          </a:prstGeom>
+        </p:spPr>
+      </p:pic>
     </p:spTree>
     <p:extLst>
       <p:ext uri="{BB962C8B-B14F-4D97-AF65-F5344CB8AC3E}">
-        <p14:creationId xmlns:p14="http://schemas.microsoft.com/office/powerpoint/2010/main" val="1565431838"/>
+        <p14:creationId xmlns:p14="http://schemas.microsoft.com/office/powerpoint/2010/main" val="2813698194"/>
       </p:ext>
     </p:extLst>
   </p:cSld>

</xml_diff>